<commit_message>
workshop 2 overhaul pt 3 (final)
</commit_message>
<xml_diff>
--- a/SP22/nlp-series/workshop-2/presentation-resources/NLP_Workshop_2_-_RNN_for_Multi-Classification.pptx
+++ b/SP22/nlp-series/workshop-2/presentation-resources/NLP_Workshop_2_-_RNN_for_Multi-Classification.pptx
@@ -21834,7 +21834,7 @@
             </a:pPr>
             <a:r>
               <a:rPr lang="en"/>
-              <a:t>Code: cla$$ification</a:t>
+              <a:t>Code: multicla$$</a:t>
             </a:r>
             <a:endParaRPr/>
           </a:p>
@@ -22479,44 +22479,44 @@
 </file>
 
 <file path=ppt/theme/theme1.xml><?xml version="1.0" encoding="utf-8"?>
-<a:theme xmlns:a="http://schemas.openxmlformats.org/drawingml/2006/main" xmlns:r="http://schemas.openxmlformats.org/officeDocument/2006/relationships" name="Simple Dark">
+<a:theme xmlns:a="http://schemas.openxmlformats.org/drawingml/2006/main" xmlns:r="http://schemas.openxmlformats.org/officeDocument/2006/relationships">
   <a:themeElements>
-    <a:clrScheme name="Simple Dark">
+    <a:clrScheme name="Default">
       <a:dk1>
-        <a:srgbClr val="FFFFFF"/>
+        <a:srgbClr val="000000"/>
       </a:dk1>
       <a:lt1>
-        <a:srgbClr val="000000"/>
+        <a:srgbClr val="FFFFFF"/>
       </a:lt1>
       <a:dk2>
-        <a:srgbClr val="333333"/>
+        <a:srgbClr val="158158"/>
       </a:dk2>
       <a:lt2>
-        <a:srgbClr val="DBDBDB"/>
+        <a:srgbClr val="F3F3F3"/>
       </a:lt2>
       <a:accent1>
-        <a:srgbClr val="51C0C0"/>
+        <a:srgbClr val="058DC7"/>
       </a:accent1>
       <a:accent2>
-        <a:srgbClr val="62B0FF"/>
+        <a:srgbClr val="50B432"/>
       </a:accent2>
       <a:accent3>
-        <a:srgbClr val="816DFF"/>
+        <a:srgbClr val="ED561B"/>
       </a:accent3>
       <a:accent4>
-        <a:srgbClr val="E981A0"/>
+        <a:srgbClr val="EDEF00"/>
       </a:accent4>
       <a:accent5>
-        <a:srgbClr val="FF6F6F"/>
+        <a:srgbClr val="24CBE5"/>
       </a:accent5>
       <a:accent6>
-        <a:srgbClr val="F9A857"/>
+        <a:srgbClr val="64E572"/>
       </a:accent6>
       <a:hlink>
-        <a:srgbClr val="51C0C0"/>
+        <a:srgbClr val="2200CC"/>
       </a:hlink>
       <a:folHlink>
-        <a:srgbClr val="4DD0E1"/>
+        <a:srgbClr val="551A8B"/>
       </a:folHlink>
     </a:clrScheme>
     <a:fontScheme name="Office">
@@ -22758,44 +22758,44 @@
 </file>
 
 <file path=ppt/theme/theme2.xml><?xml version="1.0" encoding="utf-8"?>
-<a:theme xmlns:a="http://schemas.openxmlformats.org/drawingml/2006/main" xmlns:r="http://schemas.openxmlformats.org/officeDocument/2006/relationships">
+<a:theme xmlns:a="http://schemas.openxmlformats.org/drawingml/2006/main" xmlns:r="http://schemas.openxmlformats.org/officeDocument/2006/relationships" name="Simple Dark">
   <a:themeElements>
-    <a:clrScheme name="Default">
+    <a:clrScheme name="Simple Dark">
       <a:dk1>
-        <a:srgbClr val="000000"/>
+        <a:srgbClr val="FFFFFF"/>
       </a:dk1>
       <a:lt1>
-        <a:srgbClr val="FFFFFF"/>
+        <a:srgbClr val="000000"/>
       </a:lt1>
       <a:dk2>
-        <a:srgbClr val="158158"/>
+        <a:srgbClr val="333333"/>
       </a:dk2>
       <a:lt2>
-        <a:srgbClr val="F3F3F3"/>
+        <a:srgbClr val="DBDBDB"/>
       </a:lt2>
       <a:accent1>
-        <a:srgbClr val="058DC7"/>
+        <a:srgbClr val="51C0C0"/>
       </a:accent1>
       <a:accent2>
-        <a:srgbClr val="50B432"/>
+        <a:srgbClr val="62B0FF"/>
       </a:accent2>
       <a:accent3>
-        <a:srgbClr val="ED561B"/>
+        <a:srgbClr val="816DFF"/>
       </a:accent3>
       <a:accent4>
-        <a:srgbClr val="EDEF00"/>
+        <a:srgbClr val="E981A0"/>
       </a:accent4>
       <a:accent5>
-        <a:srgbClr val="24CBE5"/>
+        <a:srgbClr val="FF6F6F"/>
       </a:accent5>
       <a:accent6>
-        <a:srgbClr val="64E572"/>
+        <a:srgbClr val="F9A857"/>
       </a:accent6>
       <a:hlink>
-        <a:srgbClr val="2200CC"/>
+        <a:srgbClr val="51C0C0"/>
       </a:hlink>
       <a:folHlink>
-        <a:srgbClr val="551A8B"/>
+        <a:srgbClr val="4DD0E1"/>
       </a:folHlink>
     </a:clrScheme>
     <a:fontScheme name="Office">

</xml_diff>